<commit_message>
Adding Corey's final presentation
</commit_message>
<xml_diff>
--- a/Presentations/ProjectPresentation_04-15-CB.pptx
+++ b/Presentations/ProjectPresentation_04-15-CB.pptx
@@ -280,7 +280,7 @@
           <a:p>
             <a:fld id="{CD63FF02-0E8F-C94D-9333-E7E525B6484A}" type="datetimeFigureOut">
               <a:rPr lang="en-US" smtClean="0"/>
-              <a:t>4/14/21</a:t>
+              <a:t>4/21/21</a:t>
             </a:fld>
             <a:endParaRPr lang="en-US"/>
           </a:p>
@@ -478,7 +478,7 @@
           <a:p>
             <a:fld id="{CD63FF02-0E8F-C94D-9333-E7E525B6484A}" type="datetimeFigureOut">
               <a:rPr lang="en-US" smtClean="0"/>
-              <a:t>4/14/21</a:t>
+              <a:t>4/21/21</a:t>
             </a:fld>
             <a:endParaRPr lang="en-US"/>
           </a:p>
@@ -686,7 +686,7 @@
           <a:p>
             <a:fld id="{CD63FF02-0E8F-C94D-9333-E7E525B6484A}" type="datetimeFigureOut">
               <a:rPr lang="en-US" smtClean="0"/>
-              <a:t>4/14/21</a:t>
+              <a:t>4/21/21</a:t>
             </a:fld>
             <a:endParaRPr lang="en-US"/>
           </a:p>
@@ -889,7 +889,7 @@
           <a:p>
             <a:fld id="{CD63FF02-0E8F-C94D-9333-E7E525B6484A}" type="datetimeFigureOut">
               <a:rPr lang="en-US" smtClean="0"/>
-              <a:t>4/14/21</a:t>
+              <a:t>4/21/21</a:t>
             </a:fld>
             <a:endParaRPr lang="en-US"/>
           </a:p>
@@ -1164,7 +1164,7 @@
           <a:p>
             <a:fld id="{CD63FF02-0E8F-C94D-9333-E7E525B6484A}" type="datetimeFigureOut">
               <a:rPr lang="en-US" smtClean="0"/>
-              <a:t>4/14/21</a:t>
+              <a:t>4/21/21</a:t>
             </a:fld>
             <a:endParaRPr lang="en-US"/>
           </a:p>
@@ -1429,7 +1429,7 @@
           <a:p>
             <a:fld id="{CD63FF02-0E8F-C94D-9333-E7E525B6484A}" type="datetimeFigureOut">
               <a:rPr lang="en-US" smtClean="0"/>
-              <a:t>4/14/21</a:t>
+              <a:t>4/21/21</a:t>
             </a:fld>
             <a:endParaRPr lang="en-US"/>
           </a:p>
@@ -1841,7 +1841,7 @@
           <a:p>
             <a:fld id="{CD63FF02-0E8F-C94D-9333-E7E525B6484A}" type="datetimeFigureOut">
               <a:rPr lang="en-US" smtClean="0"/>
-              <a:t>4/14/21</a:t>
+              <a:t>4/21/21</a:t>
             </a:fld>
             <a:endParaRPr lang="en-US"/>
           </a:p>
@@ -1982,7 +1982,7 @@
           <a:p>
             <a:fld id="{CD63FF02-0E8F-C94D-9333-E7E525B6484A}" type="datetimeFigureOut">
               <a:rPr lang="en-US" smtClean="0"/>
-              <a:t>4/14/21</a:t>
+              <a:t>4/21/21</a:t>
             </a:fld>
             <a:endParaRPr lang="en-US"/>
           </a:p>
@@ -2095,7 +2095,7 @@
           <a:p>
             <a:fld id="{CD63FF02-0E8F-C94D-9333-E7E525B6484A}" type="datetimeFigureOut">
               <a:rPr lang="en-US" smtClean="0"/>
-              <a:t>4/14/21</a:t>
+              <a:t>4/21/21</a:t>
             </a:fld>
             <a:endParaRPr lang="en-US"/>
           </a:p>
@@ -2406,7 +2406,7 @@
           <a:p>
             <a:fld id="{CD63FF02-0E8F-C94D-9333-E7E525B6484A}" type="datetimeFigureOut">
               <a:rPr lang="en-US" smtClean="0"/>
-              <a:t>4/14/21</a:t>
+              <a:t>4/21/21</a:t>
             </a:fld>
             <a:endParaRPr lang="en-US"/>
           </a:p>
@@ -2694,7 +2694,7 @@
           <a:p>
             <a:fld id="{CD63FF02-0E8F-C94D-9333-E7E525B6484A}" type="datetimeFigureOut">
               <a:rPr lang="en-US" smtClean="0"/>
-              <a:t>4/14/21</a:t>
+              <a:t>4/21/21</a:t>
             </a:fld>
             <a:endParaRPr lang="en-US"/>
           </a:p>
@@ -2944,7 +2944,7 @@
           <a:p>
             <a:fld id="{CD63FF02-0E8F-C94D-9333-E7E525B6484A}" type="datetimeFigureOut">
               <a:rPr lang="en-US" smtClean="0"/>
-              <a:t>4/14/21</a:t>
+              <a:t>4/21/21</a:t>
             </a:fld>
             <a:endParaRPr lang="en-US"/>
           </a:p>
@@ -3853,10 +3853,10 @@
       </p:sp>
       <p:grpSp>
         <p:nvGrpSpPr>
-          <p:cNvPr id="4" name="Group 3">
-            <a:extLst>
-              <a:ext uri="{FF2B5EF4-FFF2-40B4-BE49-F238E27FC236}">
-                <a16:creationId xmlns:a16="http://schemas.microsoft.com/office/drawing/2014/main" id="{DC1E07CD-51EF-7D47-8C86-49A47213435D}"/>
+          <p:cNvPr id="7" name="Group 6">
+            <a:extLst>
+              <a:ext uri="{FF2B5EF4-FFF2-40B4-BE49-F238E27FC236}">
+                <a16:creationId xmlns:a16="http://schemas.microsoft.com/office/drawing/2014/main" id="{ED135AC5-54F5-E140-8C87-D39D271B523B}"/>
               </a:ext>
             </a:extLst>
           </p:cNvPr>
@@ -3866,91 +3866,71 @@
         <p:grpSpPr>
           <a:xfrm>
             <a:off x="7313287" y="1505836"/>
-            <a:ext cx="4190821" cy="3846328"/>
-            <a:chOff x="5252499" y="4155971"/>
-            <a:chExt cx="2240280" cy="2056125"/>
+            <a:ext cx="4190821" cy="4183168"/>
+            <a:chOff x="7313287" y="1505836"/>
+            <a:chExt cx="4190821" cy="4183168"/>
           </a:xfrm>
         </p:grpSpPr>
-        <p:pic>
-          <p:nvPicPr>
-            <p:cNvPr id="5" name="Picture 4" descr="Diagram&#10;&#10;Description automatically generated">
+        <p:grpSp>
+          <p:nvGrpSpPr>
+            <p:cNvPr id="4" name="Group 3">
               <a:extLst>
                 <a:ext uri="{FF2B5EF4-FFF2-40B4-BE49-F238E27FC236}">
-                  <a16:creationId xmlns:a16="http://schemas.microsoft.com/office/drawing/2014/main" id="{8176F729-834A-0B49-AF9B-87578B3D8990}"/>
+                  <a16:creationId xmlns:a16="http://schemas.microsoft.com/office/drawing/2014/main" id="{DC1E07CD-51EF-7D47-8C86-49A47213435D}"/>
                 </a:ext>
               </a:extLst>
             </p:cNvPr>
-            <p:cNvPicPr/>
+            <p:cNvGrpSpPr/>
             <p:nvPr/>
-          </p:nvPicPr>
-          <p:blipFill>
-            <a:blip r:embed="rId2">
-              <a:extLst>
-                <a:ext uri="{28A0092B-C50C-407E-A947-70E740481C1C}">
-                  <a14:useLocalDpi xmlns:a14="http://schemas.microsoft.com/office/drawing/2010/main" val="0"/>
-                </a:ext>
-              </a:extLst>
-            </a:blip>
-            <a:stretch>
-              <a:fillRect/>
-            </a:stretch>
-          </p:blipFill>
-          <p:spPr>
+          </p:nvGrpSpPr>
+          <p:grpSpPr>
             <a:xfrm>
-              <a:off x="5252499" y="4286776"/>
-              <a:ext cx="2240280" cy="1925320"/>
+              <a:off x="7313287" y="1505836"/>
+              <a:ext cx="4190821" cy="3847428"/>
+              <a:chOff x="5252499" y="4155971"/>
+              <a:chExt cx="2240280" cy="2056713"/>
             </a:xfrm>
-            <a:prstGeom prst="rect">
-              <a:avLst/>
-            </a:prstGeom>
-          </p:spPr>
-        </p:pic>
-        <p:sp>
-          <p:nvSpPr>
-            <p:cNvPr id="6" name="TextBox 5">
-              <a:extLst>
-                <a:ext uri="{FF2B5EF4-FFF2-40B4-BE49-F238E27FC236}">
-                  <a16:creationId xmlns:a16="http://schemas.microsoft.com/office/drawing/2014/main" id="{82AE2996-2F54-FF47-8219-3F7267B2C23E}"/>
-                </a:ext>
-              </a:extLst>
-            </p:cNvPr>
-            <p:cNvSpPr txBox="1"/>
-            <p:nvPr/>
-          </p:nvSpPr>
-          <p:spPr>
-            <a:xfrm>
-              <a:off x="6151264" y="4155971"/>
-              <a:ext cx="442750" cy="261610"/>
-            </a:xfrm>
-            <a:prstGeom prst="rect">
-              <a:avLst/>
-            </a:prstGeom>
-            <a:noFill/>
-          </p:spPr>
-          <p:txBody>
-            <a:bodyPr wrap="none" rtlCol="0">
-              <a:spAutoFit/>
-            </a:bodyPr>
-            <a:lstStyle/>
-            <a:p>
-              <a:pPr algn="ctr"/>
-              <a:r>
-                <a:rPr lang="en-US" sz="1100" dirty="0"/>
-                <a:t>CNN</a:t>
-              </a:r>
-              <a:endParaRPr lang="en-US" dirty="0"/>
-            </a:p>
-          </p:txBody>
-        </p:sp>
-      </p:grpSp>
-      <mc:AlternateContent xmlns:mc="http://schemas.openxmlformats.org/markup-compatibility/2006">
-        <mc:Choice xmlns:a14="http://schemas.microsoft.com/office/drawing/2010/main" Requires="a14">
+          </p:grpSpPr>
+          <p:pic>
+            <p:nvPicPr>
+              <p:cNvPr id="5" name="Picture 4" descr="Diagram&#10;&#10;Description automatically generated">
+                <a:extLst>
+                  <a:ext uri="{FF2B5EF4-FFF2-40B4-BE49-F238E27FC236}">
+                    <a16:creationId xmlns:a16="http://schemas.microsoft.com/office/drawing/2014/main" id="{8176F729-834A-0B49-AF9B-87578B3D8990}"/>
+                  </a:ext>
+                </a:extLst>
+              </p:cNvPr>
+              <p:cNvPicPr/>
+              <p:nvPr/>
+            </p:nvPicPr>
+            <p:blipFill>
+              <a:blip r:embed="rId2">
+                <a:extLst>
+                  <a:ext uri="{28A0092B-C50C-407E-A947-70E740481C1C}">
+                    <a14:useLocalDpi xmlns:a14="http://schemas.microsoft.com/office/drawing/2010/main" val="0"/>
+                  </a:ext>
+                </a:extLst>
+              </a:blip>
+              <a:stretch>
+                <a:fillRect/>
+              </a:stretch>
+            </p:blipFill>
+            <p:spPr>
+              <a:xfrm>
+                <a:off x="5252499" y="4286776"/>
+                <a:ext cx="2240280" cy="1925908"/>
+              </a:xfrm>
+              <a:prstGeom prst="rect">
+                <a:avLst/>
+              </a:prstGeom>
+            </p:spPr>
+          </p:pic>
           <p:sp>
             <p:nvSpPr>
-              <p:cNvPr id="9" name="TextBox 8">
+              <p:cNvPr id="6" name="TextBox 5">
                 <a:extLst>
                   <a:ext uri="{FF2B5EF4-FFF2-40B4-BE49-F238E27FC236}">
-                    <a16:creationId xmlns:a16="http://schemas.microsoft.com/office/drawing/2014/main" id="{CB0239FF-BCFB-7842-A608-9AD69996455A}"/>
+                    <a16:creationId xmlns:a16="http://schemas.microsoft.com/office/drawing/2014/main" id="{82AE2996-2F54-FF47-8219-3F7267B2C23E}"/>
                   </a:ext>
                 </a:extLst>
               </p:cNvPr>
@@ -3959,8 +3939,8 @@
             </p:nvSpPr>
             <p:spPr>
               <a:xfrm>
-                <a:off x="7785304" y="5412005"/>
-                <a:ext cx="3246786" cy="276999"/>
+                <a:off x="6151264" y="4155971"/>
+                <a:ext cx="442750" cy="261610"/>
               </a:xfrm>
               <a:prstGeom prst="rect">
                 <a:avLst/>
@@ -3968,192 +3948,234 @@
               <a:noFill/>
             </p:spPr>
             <p:txBody>
-              <a:bodyPr wrap="none" lIns="0" tIns="0" rIns="0" bIns="0" rtlCol="0">
+              <a:bodyPr wrap="none" rtlCol="0">
                 <a:spAutoFit/>
               </a:bodyPr>
               <a:lstStyle/>
               <a:p>
-                <a14:m>
-                  <m:oMathPara xmlns:m="http://schemas.openxmlformats.org/officeDocument/2006/math">
-                    <m:oMathParaPr>
-                      <m:jc m:val="centerGroup"/>
-                    </m:oMathParaPr>
-                    <m:oMath xmlns:m="http://schemas.openxmlformats.org/officeDocument/2006/math">
-                      <m:r>
-                        <a:rPr lang="en-US" b="0" i="1" smtClean="0">
-                          <a:latin typeface="Cambria Math" panose="02040503050406030204" pitchFamily="18" charset="0"/>
-                        </a:rPr>
-                        <m:t>𝐹</m:t>
-                      </m:r>
-                      <m:d>
-                        <m:dPr>
-                          <m:ctrlPr>
-                            <a:rPr lang="en-US" b="0" i="1" smtClean="0">
-                              <a:latin typeface="Cambria Math" panose="02040503050406030204" pitchFamily="18" charset="0"/>
-                            </a:rPr>
-                          </m:ctrlPr>
-                        </m:dPr>
-                        <m:e>
-                          <m:r>
-                            <a:rPr lang="en-US" b="0" i="1" smtClean="0">
-                              <a:latin typeface="Cambria Math" panose="02040503050406030204" pitchFamily="18" charset="0"/>
-                            </a:rPr>
-                            <m:t>0</m:t>
-                          </m:r>
-                        </m:e>
-                      </m:d>
-                      <m:r>
-                        <a:rPr lang="en-US" b="0" i="1" smtClean="0">
-                          <a:latin typeface="Cambria Math" panose="02040503050406030204" pitchFamily="18" charset="0"/>
-                        </a:rPr>
-                        <m:t>=</m:t>
-                      </m:r>
-                      <m:r>
-                        <a:rPr lang="en-US" b="0" i="1" smtClean="0">
-                          <a:latin typeface="Cambria Math" panose="02040503050406030204" pitchFamily="18" charset="0"/>
-                        </a:rPr>
-                        <m:t>𝑥</m:t>
-                      </m:r>
-                      <m:d>
-                        <m:dPr>
-                          <m:ctrlPr>
-                            <a:rPr lang="en-US" b="0" i="1" smtClean="0">
-                              <a:latin typeface="Cambria Math" panose="02040503050406030204" pitchFamily="18" charset="0"/>
-                            </a:rPr>
-                          </m:ctrlPr>
-                        </m:dPr>
-                        <m:e>
-                          <m:r>
-                            <a:rPr lang="en-US" b="0" i="1" smtClean="0">
-                              <a:latin typeface="Cambria Math" panose="02040503050406030204" pitchFamily="18" charset="0"/>
-                            </a:rPr>
-                            <m:t>𝑡</m:t>
-                          </m:r>
-                        </m:e>
-                      </m:d>
-                      <m:r>
-                        <a:rPr lang="en-US" b="0" i="1" smtClean="0">
-                          <a:latin typeface="Cambria Math" panose="02040503050406030204" pitchFamily="18" charset="0"/>
-                        </a:rPr>
-                        <m:t>h</m:t>
-                      </m:r>
-                      <m:d>
-                        <m:dPr>
-                          <m:ctrlPr>
-                            <a:rPr lang="en-US" b="0" i="1" smtClean="0">
-                              <a:latin typeface="Cambria Math" panose="02040503050406030204" pitchFamily="18" charset="0"/>
-                            </a:rPr>
-                          </m:ctrlPr>
-                        </m:dPr>
-                        <m:e>
-                          <m:r>
-                            <a:rPr lang="en-US" b="0" i="1" smtClean="0">
-                              <a:latin typeface="Cambria Math" panose="02040503050406030204" pitchFamily="18" charset="0"/>
-                            </a:rPr>
-                            <m:t>0</m:t>
-                          </m:r>
-                        </m:e>
-                      </m:d>
-                      <m:r>
-                        <a:rPr lang="en-US" b="0" i="1" smtClean="0">
-                          <a:latin typeface="Cambria Math" panose="02040503050406030204" pitchFamily="18" charset="0"/>
-                        </a:rPr>
-                        <m:t>+</m:t>
-                      </m:r>
-                      <m:r>
-                        <a:rPr lang="en-US" b="0" i="1" smtClean="0">
-                          <a:latin typeface="Cambria Math" panose="02040503050406030204" pitchFamily="18" charset="0"/>
-                        </a:rPr>
-                        <m:t>𝑥</m:t>
-                      </m:r>
-                      <m:d>
-                        <m:dPr>
-                          <m:ctrlPr>
-                            <a:rPr lang="en-US" b="0" i="1" smtClean="0">
-                              <a:latin typeface="Cambria Math" panose="02040503050406030204" pitchFamily="18" charset="0"/>
-                            </a:rPr>
-                          </m:ctrlPr>
-                        </m:dPr>
-                        <m:e>
-                          <m:r>
-                            <a:rPr lang="en-US" b="0" i="1" smtClean="0">
-                              <a:latin typeface="Cambria Math" panose="02040503050406030204" pitchFamily="18" charset="0"/>
-                            </a:rPr>
-                            <m:t>𝑡</m:t>
-                          </m:r>
-                          <m:r>
-                            <a:rPr lang="en-US" b="0" i="1" smtClean="0">
-                              <a:latin typeface="Cambria Math" panose="02040503050406030204" pitchFamily="18" charset="0"/>
-                            </a:rPr>
-                            <m:t>−1</m:t>
-                          </m:r>
-                        </m:e>
-                      </m:d>
-                      <m:r>
-                        <a:rPr lang="en-US" b="0" i="1" smtClean="0">
-                          <a:latin typeface="Cambria Math" panose="02040503050406030204" pitchFamily="18" charset="0"/>
-                        </a:rPr>
-                        <m:t>h</m:t>
-                      </m:r>
-                      <m:r>
-                        <a:rPr lang="en-US" b="0" i="1" smtClean="0">
-                          <a:latin typeface="Cambria Math" panose="02040503050406030204" pitchFamily="18" charset="0"/>
-                        </a:rPr>
-                        <m:t>(1)</m:t>
-                      </m:r>
-                    </m:oMath>
-                  </m:oMathPara>
-                </a14:m>
+                <a:pPr algn="ctr"/>
+                <a:r>
+                  <a:rPr lang="en-US" sz="1100" dirty="0"/>
+                  <a:t>CNN</a:t>
+                </a:r>
                 <a:endParaRPr lang="en-US" dirty="0"/>
               </a:p>
             </p:txBody>
           </p:sp>
-        </mc:Choice>
-        <mc:Fallback>
-          <p:sp>
-            <p:nvSpPr>
-              <p:cNvPr id="9" name="TextBox 8">
-                <a:extLst>
-                  <a:ext uri="{FF2B5EF4-FFF2-40B4-BE49-F238E27FC236}">
-                    <a16:creationId xmlns:a16="http://schemas.microsoft.com/office/drawing/2014/main" id="{CB0239FF-BCFB-7842-A608-9AD69996455A}"/>
-                  </a:ext>
-                </a:extLst>
-              </p:cNvPr>
-              <p:cNvSpPr txBox="1">
-                <a:spLocks noRot="1" noChangeAspect="1" noMove="1" noResize="1" noEditPoints="1" noAdjustHandles="1" noChangeArrowheads="1" noChangeShapeType="1" noTextEdit="1"/>
-              </p:cNvSpPr>
-              <p:nvPr/>
-            </p:nvSpPr>
-            <p:spPr>
-              <a:xfrm>
-                <a:off x="7785304" y="5412005"/>
-                <a:ext cx="3246786" cy="276999"/>
-              </a:xfrm>
-              <a:prstGeom prst="rect">
-                <a:avLst/>
-              </a:prstGeom>
-              <a:blipFill>
-                <a:blip r:embed="rId3"/>
-                <a:stretch>
-                  <a:fillRect l="-778" t="-4545" r="-2335" b="-40909"/>
-                </a:stretch>
-              </a:blipFill>
-            </p:spPr>
-            <p:txBody>
-              <a:bodyPr/>
-              <a:lstStyle/>
-              <a:p>
-                <a:r>
-                  <a:rPr lang="en-US">
-                    <a:noFill/>
-                  </a:rPr>
-                  <a:t> </a:t>
-                </a:r>
-              </a:p>
-            </p:txBody>
-          </p:sp>
-        </mc:Fallback>
-      </mc:AlternateContent>
+        </p:grpSp>
+        <mc:AlternateContent xmlns:mc="http://schemas.openxmlformats.org/markup-compatibility/2006">
+          <mc:Choice xmlns:a14="http://schemas.microsoft.com/office/drawing/2010/main" Requires="a14">
+            <p:sp>
+              <p:nvSpPr>
+                <p:cNvPr id="9" name="TextBox 8">
+                  <a:extLst>
+                    <a:ext uri="{FF2B5EF4-FFF2-40B4-BE49-F238E27FC236}">
+                      <a16:creationId xmlns:a16="http://schemas.microsoft.com/office/drawing/2014/main" id="{CB0239FF-BCFB-7842-A608-9AD69996455A}"/>
+                    </a:ext>
+                  </a:extLst>
+                </p:cNvPr>
+                <p:cNvSpPr txBox="1"/>
+                <p:nvPr/>
+              </p:nvSpPr>
+              <p:spPr>
+                <a:xfrm>
+                  <a:off x="7785304" y="5412005"/>
+                  <a:ext cx="3246786" cy="276999"/>
+                </a:xfrm>
+                <a:prstGeom prst="rect">
+                  <a:avLst/>
+                </a:prstGeom>
+                <a:noFill/>
+              </p:spPr>
+              <p:txBody>
+                <a:bodyPr wrap="none" lIns="0" tIns="0" rIns="0" bIns="0" rtlCol="0">
+                  <a:spAutoFit/>
+                </a:bodyPr>
+                <a:lstStyle/>
+                <a:p>
+                  <a:pPr/>
+                  <a14:m>
+                    <m:oMathPara xmlns:m="http://schemas.openxmlformats.org/officeDocument/2006/math">
+                      <m:oMathParaPr>
+                        <m:jc m:val="centerGroup"/>
+                      </m:oMathParaPr>
+                      <m:oMath xmlns:m="http://schemas.openxmlformats.org/officeDocument/2006/math">
+                        <m:r>
+                          <a:rPr lang="en-US" b="0" i="1" smtClean="0">
+                            <a:latin typeface="Cambria Math" panose="02040503050406030204" pitchFamily="18" charset="0"/>
+                          </a:rPr>
+                          <m:t>𝐹</m:t>
+                        </m:r>
+                        <m:d>
+                          <m:dPr>
+                            <m:ctrlPr>
+                              <a:rPr lang="en-US" b="0" i="1" smtClean="0">
+                                <a:latin typeface="Cambria Math" panose="02040503050406030204" pitchFamily="18" charset="0"/>
+                              </a:rPr>
+                            </m:ctrlPr>
+                          </m:dPr>
+                          <m:e>
+                            <m:r>
+                              <a:rPr lang="en-US" b="0" i="1" smtClean="0">
+                                <a:latin typeface="Cambria Math" panose="02040503050406030204" pitchFamily="18" charset="0"/>
+                              </a:rPr>
+                              <m:t>0</m:t>
+                            </m:r>
+                          </m:e>
+                        </m:d>
+                        <m:r>
+                          <a:rPr lang="en-US" b="0" i="1" smtClean="0">
+                            <a:latin typeface="Cambria Math" panose="02040503050406030204" pitchFamily="18" charset="0"/>
+                          </a:rPr>
+                          <m:t>=</m:t>
+                        </m:r>
+                        <m:r>
+                          <a:rPr lang="en-US" b="0" i="1" smtClean="0">
+                            <a:latin typeface="Cambria Math" panose="02040503050406030204" pitchFamily="18" charset="0"/>
+                          </a:rPr>
+                          <m:t>𝑥</m:t>
+                        </m:r>
+                        <m:d>
+                          <m:dPr>
+                            <m:ctrlPr>
+                              <a:rPr lang="en-US" b="0" i="1" smtClean="0">
+                                <a:latin typeface="Cambria Math" panose="02040503050406030204" pitchFamily="18" charset="0"/>
+                              </a:rPr>
+                            </m:ctrlPr>
+                          </m:dPr>
+                          <m:e>
+                            <m:r>
+                              <a:rPr lang="en-US" b="0" i="1" smtClean="0">
+                                <a:latin typeface="Cambria Math" panose="02040503050406030204" pitchFamily="18" charset="0"/>
+                              </a:rPr>
+                              <m:t>𝑡</m:t>
+                            </m:r>
+                          </m:e>
+                        </m:d>
+                        <m:r>
+                          <a:rPr lang="en-US" b="0" i="1" smtClean="0">
+                            <a:latin typeface="Cambria Math" panose="02040503050406030204" pitchFamily="18" charset="0"/>
+                          </a:rPr>
+                          <m:t>h</m:t>
+                        </m:r>
+                        <m:d>
+                          <m:dPr>
+                            <m:ctrlPr>
+                              <a:rPr lang="en-US" b="0" i="1" smtClean="0">
+                                <a:latin typeface="Cambria Math" panose="02040503050406030204" pitchFamily="18" charset="0"/>
+                              </a:rPr>
+                            </m:ctrlPr>
+                          </m:dPr>
+                          <m:e>
+                            <m:r>
+                              <a:rPr lang="en-US" b="0" i="1" smtClean="0">
+                                <a:latin typeface="Cambria Math" panose="02040503050406030204" pitchFamily="18" charset="0"/>
+                              </a:rPr>
+                              <m:t>0</m:t>
+                            </m:r>
+                          </m:e>
+                        </m:d>
+                        <m:r>
+                          <a:rPr lang="en-US" b="0" i="1" smtClean="0">
+                            <a:latin typeface="Cambria Math" panose="02040503050406030204" pitchFamily="18" charset="0"/>
+                          </a:rPr>
+                          <m:t>+</m:t>
+                        </m:r>
+                        <m:r>
+                          <a:rPr lang="en-US" b="0" i="1" smtClean="0">
+                            <a:latin typeface="Cambria Math" panose="02040503050406030204" pitchFamily="18" charset="0"/>
+                          </a:rPr>
+                          <m:t>𝑥</m:t>
+                        </m:r>
+                        <m:d>
+                          <m:dPr>
+                            <m:ctrlPr>
+                              <a:rPr lang="en-US" b="0" i="1" smtClean="0">
+                                <a:latin typeface="Cambria Math" panose="02040503050406030204" pitchFamily="18" charset="0"/>
+                              </a:rPr>
+                            </m:ctrlPr>
+                          </m:dPr>
+                          <m:e>
+                            <m:r>
+                              <a:rPr lang="en-US" b="0" i="1" smtClean="0">
+                                <a:latin typeface="Cambria Math" panose="02040503050406030204" pitchFamily="18" charset="0"/>
+                              </a:rPr>
+                              <m:t>𝑡</m:t>
+                            </m:r>
+                            <m:r>
+                              <a:rPr lang="en-US" b="0" i="1" smtClean="0">
+                                <a:latin typeface="Cambria Math" panose="02040503050406030204" pitchFamily="18" charset="0"/>
+                              </a:rPr>
+                              <m:t>−1</m:t>
+                            </m:r>
+                          </m:e>
+                        </m:d>
+                        <m:r>
+                          <a:rPr lang="en-US" b="0" i="1" smtClean="0">
+                            <a:latin typeface="Cambria Math" panose="02040503050406030204" pitchFamily="18" charset="0"/>
+                          </a:rPr>
+                          <m:t>h</m:t>
+                        </m:r>
+                        <m:r>
+                          <a:rPr lang="en-US" b="0" i="1" smtClean="0">
+                            <a:latin typeface="Cambria Math" panose="02040503050406030204" pitchFamily="18" charset="0"/>
+                          </a:rPr>
+                          <m:t>(1)</m:t>
+                        </m:r>
+                      </m:oMath>
+                    </m:oMathPara>
+                  </a14:m>
+                  <a:endParaRPr lang="en-US" dirty="0"/>
+                </a:p>
+              </p:txBody>
+            </p:sp>
+          </mc:Choice>
+          <mc:Fallback>
+            <p:sp>
+              <p:nvSpPr>
+                <p:cNvPr id="9" name="TextBox 8">
+                  <a:extLst>
+                    <a:ext uri="{FF2B5EF4-FFF2-40B4-BE49-F238E27FC236}">
+                      <a16:creationId xmlns:a16="http://schemas.microsoft.com/office/drawing/2014/main" id="{CB0239FF-BCFB-7842-A608-9AD69996455A}"/>
+                    </a:ext>
+                  </a:extLst>
+                </p:cNvPr>
+                <p:cNvSpPr txBox="1">
+                  <a:spLocks noRot="1" noChangeAspect="1" noMove="1" noResize="1" noEditPoints="1" noAdjustHandles="1" noChangeArrowheads="1" noChangeShapeType="1" noTextEdit="1"/>
+                </p:cNvSpPr>
+                <p:nvPr/>
+              </p:nvSpPr>
+              <p:spPr>
+                <a:xfrm>
+                  <a:off x="7785304" y="5412005"/>
+                  <a:ext cx="3246786" cy="276999"/>
+                </a:xfrm>
+                <a:prstGeom prst="rect">
+                  <a:avLst/>
+                </a:prstGeom>
+                <a:blipFill>
+                  <a:blip r:embed="rId3"/>
+                  <a:stretch>
+                    <a:fillRect l="-778" t="-4545" r="-2335" b="-40909"/>
+                  </a:stretch>
+                </a:blipFill>
+              </p:spPr>
+              <p:txBody>
+                <a:bodyPr/>
+                <a:lstStyle/>
+                <a:p>
+                  <a:r>
+                    <a:rPr lang="en-US">
+                      <a:noFill/>
+                    </a:rPr>
+                    <a:t> </a:t>
+                  </a:r>
+                </a:p>
+              </p:txBody>
+            </p:sp>
+          </mc:Fallback>
+        </mc:AlternateContent>
+      </p:grpSp>
     </p:spTree>
     <p:extLst>
       <p:ext uri="{BB962C8B-B14F-4D97-AF65-F5344CB8AC3E}">

</xml_diff>